<commit_message>
edit slide , report part
</commit_message>
<xml_diff>
--- a/WIP/Users/HoangLG/Carrier-Trading-Center (1).pptx
+++ b/WIP/Users/HoangLG/Carrier-Trading-Center (1).pptx
@@ -41,9 +41,10 @@
     <p:sldId id="295" r:id="rId35"/>
     <p:sldId id="297" r:id="rId36"/>
     <p:sldId id="298" r:id="rId37"/>
-    <p:sldId id="283" r:id="rId38"/>
-    <p:sldId id="284" r:id="rId39"/>
-    <p:sldId id="285" r:id="rId40"/>
+    <p:sldId id="299" r:id="rId38"/>
+    <p:sldId id="300" r:id="rId39"/>
+    <p:sldId id="284" r:id="rId40"/>
+    <p:sldId id="285" r:id="rId41"/>
   </p:sldIdLst>
   <p:sldSz cx="12192000" cy="6858000"/>
   <p:notesSz cx="6858000" cy="9144000"/>
@@ -6582,14 +6583,14 @@
           </a:ln>
           <a:extLst>
             <a:ext uri="{909E8E84-426E-40dd-AFC4-6F175D3DCCD1}">
-              <a14:hiddenFill xmlns:a14="http://schemas.microsoft.com/office/drawing/2010/main" xmlns="">
+              <a14:hiddenFill xmlns="" xmlns:a14="http://schemas.microsoft.com/office/drawing/2010/main">
                 <a:solidFill>
                   <a:srgbClr val="FFFFFF"/>
                 </a:solidFill>
               </a14:hiddenFill>
             </a:ext>
             <a:ext uri="{91240B29-F687-4f45-9708-019B960494DF}">
-              <a14:hiddenLine xmlns:a14="http://schemas.microsoft.com/office/drawing/2010/main" xmlns="" w="9525">
+              <a14:hiddenLine xmlns="" xmlns:a14="http://schemas.microsoft.com/office/drawing/2010/main" w="9525">
                 <a:solidFill>
                   <a:srgbClr val="000000"/>
                 </a:solidFill>
@@ -22538,7 +22539,7 @@
           <p:nvPr>
             <p:extLst>
               <p:ext uri="{D42A27DB-BD31-4B8C-83A1-F6EECF244321}">
-                <p14:modId xmlns:p14="http://schemas.microsoft.com/office/powerpoint/2010/main" val="2704479198"/>
+                <p14:modId xmlns:p14="http://schemas.microsoft.com/office/powerpoint/2010/main" val="77181848"/>
               </p:ext>
             </p:extLst>
           </p:nvPr>
@@ -22681,37 +22682,16 @@
                         </a:spcAft>
                       </a:pPr>
                       <a:r>
-                        <a:rPr lang="en-US" sz="2000" dirty="0">
+                        <a:rPr lang="en-US" sz="2000" b="1" kern="1200">
                           <a:solidFill>
-                            <a:schemeClr val="bg2">
-                              <a:lumMod val="10000"/>
-                            </a:schemeClr>
+                            <a:schemeClr val="bg1"/>
                           </a:solidFill>
                           <a:effectLst/>
+                          <a:latin typeface="+mn-lt"/>
+                          <a:ea typeface="+mn-ea"/>
+                          <a:cs typeface="+mn-cs"/>
                         </a:rPr>
-                        <a:t>Develop an </a:t>
-                      </a:r>
-                      <a:r>
-                        <a:rPr lang="en-US" sz="2000" dirty="0" err="1">
-                          <a:solidFill>
-                            <a:schemeClr val="bg2">
-                              <a:lumMod val="10000"/>
-                            </a:schemeClr>
-                          </a:solidFill>
-                          <a:effectLst/>
-                        </a:rPr>
-                        <a:t>iOS</a:t>
-                      </a:r>
-                      <a:r>
-                        <a:rPr lang="en-US" sz="2000" dirty="0">
-                          <a:solidFill>
-                            <a:schemeClr val="bg2">
-                              <a:lumMod val="10000"/>
-                            </a:schemeClr>
-                          </a:solidFill>
-                          <a:effectLst/>
-                        </a:rPr>
-                        <a:t> application that helps users to create, manage and work with their mind maps</a:t>
+                        <a:t>Create a web application that connect Goods Owner and Carrier with to minimize transportation costs.</a:t>
                       </a:r>
                       <a:endParaRPr lang="vi-VN" sz="2000" b="0" dirty="0">
                         <a:solidFill>
@@ -22897,10 +22877,16 @@
                         </a:spcAft>
                       </a:pPr>
                       <a:r>
-                        <a:rPr lang="en-US" sz="2000" dirty="0">
+                        <a:rPr lang="en-US" sz="2000" kern="1200">
+                          <a:solidFill>
+                            <a:schemeClr val="tx1"/>
+                          </a:solidFill>
                           <a:effectLst/>
+                          <a:latin typeface="+mn-lt"/>
+                          <a:ea typeface="+mn-ea"/>
+                          <a:cs typeface="+mn-cs"/>
                         </a:rPr>
-                        <a:t>Provide a free and Vietnamese supported application for Vietnamese users</a:t>
+                        <a:t>Create a new system in circumstance there is no similar system exists.</a:t>
                       </a:r>
                       <a:endParaRPr lang="vi-VN" sz="2000" dirty="0">
                         <a:solidFill>
@@ -25296,7 +25282,7 @@
         </p:blipFill>
         <p:spPr>
           <a:xfrm>
-            <a:off x="8933478" y="1939512"/>
+            <a:off x="8173823" y="2085316"/>
             <a:ext cx="3258522" cy="4814887"/>
           </a:xfrm>
           <a:prstGeom prst="foldedCorner">
@@ -25304,9 +25290,7 @@
           </a:prstGeom>
           <a:ln>
             <a:solidFill>
-              <a:schemeClr val="accent2">
-                <a:lumMod val="75000"/>
-              </a:schemeClr>
+              <a:schemeClr val="accent1"/>
             </a:solidFill>
           </a:ln>
         </p:spPr>
@@ -25319,8 +25303,8 @@
         </p:nvSpPr>
         <p:spPr>
           <a:xfrm>
-            <a:off x="4800600" y="3986047"/>
-            <a:ext cx="2902744" cy="484632"/>
+            <a:off x="5092505" y="3986047"/>
+            <a:ext cx="2307101" cy="484632"/>
           </a:xfrm>
           <a:prstGeom prst="rightArrow">
             <a:avLst/>
@@ -25772,6 +25756,11 @@
           <a:prstGeom prst="ellipse">
             <a:avLst/>
           </a:prstGeom>
+          <a:ln>
+            <a:solidFill>
+              <a:schemeClr val="accent1"/>
+            </a:solidFill>
+          </a:ln>
         </p:spPr>
       </p:pic>
       <p:pic>
@@ -25796,6 +25785,11 @@
           <a:prstGeom prst="ellipse">
             <a:avLst/>
           </a:prstGeom>
+          <a:ln>
+            <a:solidFill>
+              <a:schemeClr val="accent1"/>
+            </a:solidFill>
+          </a:ln>
         </p:spPr>
       </p:pic>
       <p:sp>
@@ -25874,7 +25868,7 @@
         </p:nvSpPr>
         <p:spPr>
           <a:xfrm>
-            <a:off x="772298" y="1081798"/>
+            <a:off x="772297" y="488673"/>
             <a:ext cx="4703805" cy="593125"/>
           </a:xfrm>
           <a:prstGeom prst="homePlate">
@@ -25915,7 +25909,7 @@
         </p:nvSpPr>
         <p:spPr>
           <a:xfrm>
-            <a:off x="5278984" y="1081798"/>
+            <a:off x="5278985" y="488673"/>
             <a:ext cx="4703805" cy="593125"/>
           </a:xfrm>
           <a:prstGeom prst="chevron">
@@ -25948,743 +25942,142 @@
           </a:p>
         </p:txBody>
       </p:sp>
-      <p:graphicFrame>
-        <p:nvGraphicFramePr>
-          <p:cNvPr id="6" name="Table 5"/>
-          <p:cNvGraphicFramePr>
-            <a:graphicFrameLocks noGrp="1"/>
-          </p:cNvGraphicFramePr>
-          <p:nvPr>
-            <p:extLst>
-              <p:ext uri="{D42A27DB-BD31-4B8C-83A1-F6EECF244321}">
-                <p14:modId xmlns:p14="http://schemas.microsoft.com/office/powerpoint/2010/main" val="2871184219"/>
-              </p:ext>
-            </p:extLst>
-          </p:nvPr>
-        </p:nvGraphicFramePr>
-        <p:xfrm>
-          <a:off x="772297" y="2038350"/>
-          <a:ext cx="10071915" cy="4535118"/>
-        </p:xfrm>
-        <a:graphic>
-          <a:graphicData uri="http://schemas.openxmlformats.org/drawingml/2006/table">
-            <a:tbl>
-              <a:tblPr firstRow="1" bandRow="1">
-                <a:tableStyleId>{C083E6E3-FA7D-4D7B-A595-EF9225AFEA82}</a:tableStyleId>
-              </a:tblPr>
-              <a:tblGrid>
-                <a:gridCol w="2691426">
-                  <a:extLst>
-                    <a:ext uri="{9D8B030D-6E8A-4147-A177-3AD203B41FA5}">
-                      <a16:colId xmlns:a16="http://schemas.microsoft.com/office/drawing/2014/main" val="20000"/>
-                    </a:ext>
-                  </a:extLst>
-                </a:gridCol>
-                <a:gridCol w="3357305">
-                  <a:extLst>
-                    <a:ext uri="{9D8B030D-6E8A-4147-A177-3AD203B41FA5}">
-                      <a16:colId xmlns:a16="http://schemas.microsoft.com/office/drawing/2014/main" val="20001"/>
-                    </a:ext>
-                  </a:extLst>
-                </a:gridCol>
-                <a:gridCol w="4023184">
-                  <a:extLst>
-                    <a:ext uri="{9D8B030D-6E8A-4147-A177-3AD203B41FA5}">
-                      <a16:colId xmlns:a16="http://schemas.microsoft.com/office/drawing/2014/main" val="20002"/>
-                    </a:ext>
-                  </a:extLst>
-                </a:gridCol>
-              </a:tblGrid>
-              <a:tr h="734974">
-                <a:tc>
-                  <a:txBody>
-                    <a:bodyPr/>
-                    <a:lstStyle/>
-                    <a:p>
-                      <a:pPr algn="ctr">
-                        <a:lnSpc>
-                          <a:spcPct val="150000"/>
-                        </a:lnSpc>
-                      </a:pPr>
-                      <a:r>
-                        <a:rPr lang="en-US" sz="2300" dirty="0"/>
-                        <a:t>Situation</a:t>
-                      </a:r>
-                      <a:endParaRPr lang="en-US" sz="2300" dirty="0">
-                        <a:latin typeface="Times" pitchFamily="18" charset="0"/>
-                        <a:cs typeface="Times" pitchFamily="18" charset="0"/>
-                      </a:endParaRPr>
-                    </a:p>
-                  </a:txBody>
-                  <a:tcPr anchor="ctr">
-                    <a:lnL w="12700" cap="flat" cmpd="sng" algn="ctr">
-                      <a:solidFill>
-                        <a:schemeClr val="tx1"/>
-                      </a:solidFill>
-                      <a:prstDash val="solid"/>
-                      <a:round/>
-                      <a:headEnd type="none" w="med" len="med"/>
-                      <a:tailEnd type="none" w="med" len="med"/>
-                    </a:lnL>
-                    <a:lnR w="12700" cap="flat" cmpd="sng" algn="ctr">
-                      <a:solidFill>
-                        <a:schemeClr val="tx1"/>
-                      </a:solidFill>
-                      <a:prstDash val="solid"/>
-                      <a:round/>
-                      <a:headEnd type="none" w="med" len="med"/>
-                      <a:tailEnd type="none" w="med" len="med"/>
-                    </a:lnR>
-                    <a:lnT w="12700" cap="flat" cmpd="sng" algn="ctr">
-                      <a:solidFill>
-                        <a:schemeClr val="tx1"/>
-                      </a:solidFill>
-                      <a:prstDash val="solid"/>
-                      <a:round/>
-                      <a:headEnd type="none" w="med" len="med"/>
-                      <a:tailEnd type="none" w="med" len="med"/>
-                    </a:lnT>
-                    <a:lnB w="12700" cap="flat" cmpd="sng" algn="ctr">
-                      <a:solidFill>
-                        <a:schemeClr val="tx1"/>
-                      </a:solidFill>
-                      <a:prstDash val="solid"/>
-                      <a:round/>
-                      <a:headEnd type="none" w="med" len="med"/>
-                      <a:tailEnd type="none" w="med" len="med"/>
-                    </a:lnB>
-                  </a:tcPr>
-                </a:tc>
-                <a:tc>
-                  <a:txBody>
-                    <a:bodyPr/>
-                    <a:lstStyle/>
-                    <a:p>
-                      <a:pPr algn="ctr">
-                        <a:lnSpc>
-                          <a:spcPct val="150000"/>
-                        </a:lnSpc>
-                      </a:pPr>
-                      <a:r>
-                        <a:rPr lang="en-US" sz="2300" dirty="0"/>
-                        <a:t>Problem</a:t>
-                      </a:r>
-                      <a:endParaRPr lang="en-US" sz="2300" dirty="0">
-                        <a:latin typeface="Times" pitchFamily="18" charset="0"/>
-                        <a:cs typeface="Times" pitchFamily="18" charset="0"/>
-                      </a:endParaRPr>
-                    </a:p>
-                  </a:txBody>
-                  <a:tcPr anchor="ctr">
-                    <a:lnL w="12700" cap="flat" cmpd="sng" algn="ctr">
-                      <a:solidFill>
-                        <a:schemeClr val="tx1"/>
-                      </a:solidFill>
-                      <a:prstDash val="solid"/>
-                      <a:round/>
-                      <a:headEnd type="none" w="med" len="med"/>
-                      <a:tailEnd type="none" w="med" len="med"/>
-                    </a:lnL>
-                    <a:lnR w="12700" cap="flat" cmpd="sng" algn="ctr">
-                      <a:solidFill>
-                        <a:schemeClr val="tx1"/>
-                      </a:solidFill>
-                      <a:prstDash val="solid"/>
-                      <a:round/>
-                      <a:headEnd type="none" w="med" len="med"/>
-                      <a:tailEnd type="none" w="med" len="med"/>
-                    </a:lnR>
-                    <a:lnT w="12700" cap="flat" cmpd="sng" algn="ctr">
-                      <a:solidFill>
-                        <a:schemeClr val="tx1"/>
-                      </a:solidFill>
-                      <a:prstDash val="solid"/>
-                      <a:round/>
-                      <a:headEnd type="none" w="med" len="med"/>
-                      <a:tailEnd type="none" w="med" len="med"/>
-                    </a:lnT>
-                    <a:lnB w="12700" cap="flat" cmpd="sng" algn="ctr">
-                      <a:solidFill>
-                        <a:schemeClr val="tx1"/>
-                      </a:solidFill>
-                      <a:prstDash val="solid"/>
-                      <a:round/>
-                      <a:headEnd type="none" w="med" len="med"/>
-                      <a:tailEnd type="none" w="med" len="med"/>
-                    </a:lnB>
-                  </a:tcPr>
-                </a:tc>
-                <a:tc>
-                  <a:txBody>
-                    <a:bodyPr/>
-                    <a:lstStyle/>
-                    <a:p>
-                      <a:pPr algn="ctr">
-                        <a:lnSpc>
-                          <a:spcPct val="150000"/>
-                        </a:lnSpc>
-                      </a:pPr>
-                      <a:r>
-                        <a:rPr lang="en-US" sz="2300" dirty="0"/>
-                        <a:t>Lessons</a:t>
-                      </a:r>
-                      <a:r>
-                        <a:rPr lang="en-US" sz="2300" baseline="0" dirty="0"/>
-                        <a:t> learned</a:t>
-                      </a:r>
-                      <a:endParaRPr lang="en-US" sz="2300" dirty="0">
-                        <a:latin typeface="Times" pitchFamily="18" charset="0"/>
-                        <a:cs typeface="Times" pitchFamily="18" charset="0"/>
-                      </a:endParaRPr>
-                    </a:p>
-                  </a:txBody>
-                  <a:tcPr anchor="ctr">
-                    <a:lnL w="12700" cap="flat" cmpd="sng" algn="ctr">
-                      <a:solidFill>
-                        <a:schemeClr val="tx1"/>
-                      </a:solidFill>
-                      <a:prstDash val="solid"/>
-                      <a:round/>
-                      <a:headEnd type="none" w="med" len="med"/>
-                      <a:tailEnd type="none" w="med" len="med"/>
-                    </a:lnL>
-                    <a:lnR w="12700" cap="flat" cmpd="sng" algn="ctr">
-                      <a:solidFill>
-                        <a:schemeClr val="tx1"/>
-                      </a:solidFill>
-                      <a:prstDash val="solid"/>
-                      <a:round/>
-                      <a:headEnd type="none" w="med" len="med"/>
-                      <a:tailEnd type="none" w="med" len="med"/>
-                    </a:lnR>
-                    <a:lnT w="12700" cap="flat" cmpd="sng" algn="ctr">
-                      <a:solidFill>
-                        <a:schemeClr val="tx1"/>
-                      </a:solidFill>
-                      <a:prstDash val="solid"/>
-                      <a:round/>
-                      <a:headEnd type="none" w="med" len="med"/>
-                      <a:tailEnd type="none" w="med" len="med"/>
-                    </a:lnT>
-                    <a:lnB w="12700" cap="flat" cmpd="sng" algn="ctr">
-                      <a:solidFill>
-                        <a:schemeClr val="tx1"/>
-                      </a:solidFill>
-                      <a:prstDash val="solid"/>
-                      <a:round/>
-                      <a:headEnd type="none" w="med" len="med"/>
-                      <a:tailEnd type="none" w="med" len="med"/>
-                    </a:lnB>
-                  </a:tcPr>
-                </a:tc>
-                <a:extLst>
-                  <a:ext uri="{0D108BD9-81ED-4DB2-BD59-A6C34878D82A}">
-                    <a16:rowId xmlns:a16="http://schemas.microsoft.com/office/drawing/2014/main" val="10000"/>
-                  </a:ext>
-                </a:extLst>
-              </a:tr>
-              <a:tr h="1469948">
-                <a:tc>
-                  <a:txBody>
-                    <a:bodyPr/>
-                    <a:lstStyle/>
-                    <a:p>
-                      <a:pPr algn="ctr">
-                        <a:lnSpc>
-                          <a:spcPct val="150000"/>
-                        </a:lnSpc>
-                      </a:pPr>
-                      <a:r>
-                        <a:rPr lang="en-US" sz="2000" b="1" dirty="0">
-                          <a:latin typeface="+mj-lt"/>
-                          <a:cs typeface="Times" pitchFamily="18" charset="0"/>
-                        </a:rPr>
-                        <a:t>Conflict in team</a:t>
-                      </a:r>
-                    </a:p>
-                  </a:txBody>
-                  <a:tcPr anchor="ctr">
-                    <a:lnL w="12700" cap="flat" cmpd="sng" algn="ctr">
-                      <a:solidFill>
-                        <a:schemeClr val="tx1"/>
-                      </a:solidFill>
-                      <a:prstDash val="solid"/>
-                      <a:round/>
-                      <a:headEnd type="none" w="med" len="med"/>
-                      <a:tailEnd type="none" w="med" len="med"/>
-                    </a:lnL>
-                    <a:lnR w="12700" cap="flat" cmpd="sng" algn="ctr">
-                      <a:solidFill>
-                        <a:schemeClr val="tx1"/>
-                      </a:solidFill>
-                      <a:prstDash val="solid"/>
-                      <a:round/>
-                      <a:headEnd type="none" w="med" len="med"/>
-                      <a:tailEnd type="none" w="med" len="med"/>
-                    </a:lnR>
-                    <a:lnT w="12700" cap="flat" cmpd="sng" algn="ctr">
-                      <a:solidFill>
-                        <a:schemeClr val="tx1"/>
-                      </a:solidFill>
-                      <a:prstDash val="solid"/>
-                      <a:round/>
-                      <a:headEnd type="none" w="med" len="med"/>
-                      <a:tailEnd type="none" w="med" len="med"/>
-                    </a:lnT>
-                    <a:lnB w="12700" cap="flat" cmpd="sng" algn="ctr">
-                      <a:solidFill>
-                        <a:schemeClr val="tx1"/>
-                      </a:solidFill>
-                      <a:prstDash val="solid"/>
-                      <a:round/>
-                      <a:headEnd type="none" w="med" len="med"/>
-                      <a:tailEnd type="none" w="med" len="med"/>
-                    </a:lnB>
-                  </a:tcPr>
-                </a:tc>
-                <a:tc>
-                  <a:txBody>
-                    <a:bodyPr/>
-                    <a:lstStyle/>
-                    <a:p>
-                      <a:pPr marL="342900" indent="-342900" algn="l">
-                        <a:lnSpc>
-                          <a:spcPct val="150000"/>
-                        </a:lnSpc>
-                        <a:buFont typeface="Wingdings" panose="05000000000000000000" pitchFamily="2" charset="2"/>
-                        <a:buChar char="ü"/>
-                      </a:pPr>
-                      <a:r>
-                        <a:rPr lang="en-US" sz="2000" b="1">
-                          <a:latin typeface="+mj-lt"/>
-                          <a:cs typeface="Times" pitchFamily="18" charset="0"/>
-                        </a:rPr>
-                        <a:t>Communication skills</a:t>
-                      </a:r>
-                      <a:endParaRPr lang="en-US" sz="2000" b="1" baseline="0" dirty="0">
-                        <a:latin typeface="+mj-lt"/>
-                        <a:cs typeface="Times" pitchFamily="18" charset="0"/>
-                      </a:endParaRPr>
-                    </a:p>
-                    <a:p>
-                      <a:pPr marL="342900" indent="-342900" algn="l">
-                        <a:lnSpc>
-                          <a:spcPct val="150000"/>
-                        </a:lnSpc>
-                        <a:buFont typeface="Wingdings" panose="05000000000000000000" pitchFamily="2" charset="2"/>
-                        <a:buChar char="ü"/>
-                      </a:pPr>
-                      <a:r>
-                        <a:rPr lang="en-US" sz="2000" b="1" i="0" kern="1200">
-                          <a:solidFill>
-                            <a:schemeClr val="tx1"/>
-                          </a:solidFill>
-                          <a:effectLst/>
-                          <a:latin typeface="+mj-lt"/>
-                          <a:ea typeface="+mn-ea"/>
-                          <a:cs typeface="+mn-cs"/>
-                        </a:rPr>
-                        <a:t>A lot of things to do</a:t>
-                      </a:r>
-                      <a:endParaRPr lang="en-US" sz="2000" b="1" i="0" dirty="0">
-                        <a:latin typeface="+mj-lt"/>
-                        <a:cs typeface="Times" pitchFamily="18" charset="0"/>
-                      </a:endParaRPr>
-                    </a:p>
-                  </a:txBody>
-                  <a:tcPr anchor="ctr">
-                    <a:lnL w="12700" cap="flat" cmpd="sng" algn="ctr">
-                      <a:solidFill>
-                        <a:schemeClr val="tx1"/>
-                      </a:solidFill>
-                      <a:prstDash val="solid"/>
-                      <a:round/>
-                      <a:headEnd type="none" w="med" len="med"/>
-                      <a:tailEnd type="none" w="med" len="med"/>
-                    </a:lnL>
-                    <a:lnR w="12700" cap="flat" cmpd="sng" algn="ctr">
-                      <a:solidFill>
-                        <a:schemeClr val="tx1"/>
-                      </a:solidFill>
-                      <a:prstDash val="solid"/>
-                      <a:round/>
-                      <a:headEnd type="none" w="med" len="med"/>
-                      <a:tailEnd type="none" w="med" len="med"/>
-                    </a:lnR>
-                    <a:lnT w="12700" cap="flat" cmpd="sng" algn="ctr">
-                      <a:solidFill>
-                        <a:schemeClr val="tx1"/>
-                      </a:solidFill>
-                      <a:prstDash val="solid"/>
-                      <a:round/>
-                      <a:headEnd type="none" w="med" len="med"/>
-                      <a:tailEnd type="none" w="med" len="med"/>
-                    </a:lnT>
-                    <a:lnB w="12700" cap="flat" cmpd="sng" algn="ctr">
-                      <a:solidFill>
-                        <a:schemeClr val="tx1"/>
-                      </a:solidFill>
-                      <a:prstDash val="solid"/>
-                      <a:round/>
-                      <a:headEnd type="none" w="med" len="med"/>
-                      <a:tailEnd type="none" w="med" len="med"/>
-                    </a:lnB>
-                  </a:tcPr>
-                </a:tc>
-                <a:tc>
-                  <a:txBody>
-                    <a:bodyPr/>
-                    <a:lstStyle/>
-                    <a:p>
-                      <a:pPr algn="l">
-                        <a:lnSpc>
-                          <a:spcPct val="150000"/>
-                        </a:lnSpc>
-                        <a:buFont typeface="Wingdings" pitchFamily="2" charset="2"/>
-                        <a:buChar char="ü"/>
-                      </a:pPr>
-                      <a:r>
-                        <a:rPr lang="en-US" sz="2000" b="1">
-                          <a:latin typeface="+mj-lt"/>
-                          <a:cs typeface="Times" pitchFamily="18" charset="0"/>
-                        </a:rPr>
-                        <a:t> Listening more than what meets the ear</a:t>
-                      </a:r>
-                    </a:p>
-                    <a:p>
-                      <a:pPr algn="l">
-                        <a:lnSpc>
-                          <a:spcPct val="150000"/>
-                        </a:lnSpc>
-                        <a:buFont typeface="Wingdings" pitchFamily="2" charset="2"/>
-                        <a:buChar char="ü"/>
-                      </a:pPr>
-                      <a:r>
-                        <a:rPr lang="en-US" sz="2000" b="1">
-                          <a:latin typeface="+mj-lt"/>
-                          <a:cs typeface="Times" pitchFamily="18" charset="0"/>
-                        </a:rPr>
-                        <a:t> Working in priority</a:t>
-                      </a:r>
-                    </a:p>
-                  </a:txBody>
-                  <a:tcPr anchor="ctr">
-                    <a:lnL w="12700" cap="flat" cmpd="sng" algn="ctr">
-                      <a:solidFill>
-                        <a:schemeClr val="tx1"/>
-                      </a:solidFill>
-                      <a:prstDash val="solid"/>
-                      <a:round/>
-                      <a:headEnd type="none" w="med" len="med"/>
-                      <a:tailEnd type="none" w="med" len="med"/>
-                    </a:lnL>
-                    <a:lnR w="12700" cap="flat" cmpd="sng" algn="ctr">
-                      <a:solidFill>
-                        <a:schemeClr val="tx1"/>
-                      </a:solidFill>
-                      <a:prstDash val="solid"/>
-                      <a:round/>
-                      <a:headEnd type="none" w="med" len="med"/>
-                      <a:tailEnd type="none" w="med" len="med"/>
-                    </a:lnR>
-                    <a:lnT w="12700" cap="flat" cmpd="sng" algn="ctr">
-                      <a:solidFill>
-                        <a:schemeClr val="tx1"/>
-                      </a:solidFill>
-                      <a:prstDash val="solid"/>
-                      <a:round/>
-                      <a:headEnd type="none" w="med" len="med"/>
-                      <a:tailEnd type="none" w="med" len="med"/>
-                    </a:lnT>
-                    <a:lnB w="12700" cap="flat" cmpd="sng" algn="ctr">
-                      <a:solidFill>
-                        <a:schemeClr val="tx1"/>
-                      </a:solidFill>
-                      <a:prstDash val="solid"/>
-                      <a:round/>
-                      <a:headEnd type="none" w="med" len="med"/>
-                      <a:tailEnd type="none" w="med" len="med"/>
-                    </a:lnB>
-                  </a:tcPr>
-                </a:tc>
-                <a:extLst>
-                  <a:ext uri="{0D108BD9-81ED-4DB2-BD59-A6C34878D82A}">
-                    <a16:rowId xmlns:a16="http://schemas.microsoft.com/office/drawing/2014/main" val="10001"/>
-                  </a:ext>
-                </a:extLst>
-              </a:tr>
-              <a:tr h="2043228">
-                <a:tc>
-                  <a:txBody>
-                    <a:bodyPr/>
-                    <a:lstStyle/>
-                    <a:p>
-                      <a:pPr algn="ctr">
-                        <a:lnSpc>
-                          <a:spcPct val="150000"/>
-                        </a:lnSpc>
-                      </a:pPr>
-                      <a:r>
-                        <a:rPr lang="en-US" sz="2000" b="1" dirty="0">
-                          <a:latin typeface="+mj-lt"/>
-                          <a:cs typeface="Times" pitchFamily="18" charset="0"/>
-                        </a:rPr>
-                        <a:t>Technical difficulties</a:t>
-                      </a:r>
-                    </a:p>
-                  </a:txBody>
-                  <a:tcPr anchor="ctr">
-                    <a:lnL w="12700" cap="flat" cmpd="sng" algn="ctr">
-                      <a:solidFill>
-                        <a:schemeClr val="tx1"/>
-                      </a:solidFill>
-                      <a:prstDash val="solid"/>
-                      <a:round/>
-                      <a:headEnd type="none" w="med" len="med"/>
-                      <a:tailEnd type="none" w="med" len="med"/>
-                    </a:lnL>
-                    <a:lnR w="12700" cap="flat" cmpd="sng" algn="ctr">
-                      <a:solidFill>
-                        <a:schemeClr val="tx1"/>
-                      </a:solidFill>
-                      <a:prstDash val="solid"/>
-                      <a:round/>
-                      <a:headEnd type="none" w="med" len="med"/>
-                      <a:tailEnd type="none" w="med" len="med"/>
-                    </a:lnR>
-                    <a:lnT w="12700" cap="flat" cmpd="sng" algn="ctr">
-                      <a:solidFill>
-                        <a:schemeClr val="tx1"/>
-                      </a:solidFill>
-                      <a:prstDash val="solid"/>
-                      <a:round/>
-                      <a:headEnd type="none" w="med" len="med"/>
-                      <a:tailEnd type="none" w="med" len="med"/>
-                    </a:lnT>
-                    <a:lnB w="12700" cap="flat" cmpd="sng" algn="ctr">
-                      <a:solidFill>
-                        <a:schemeClr val="tx1"/>
-                      </a:solidFill>
-                      <a:prstDash val="solid"/>
-                      <a:round/>
-                      <a:headEnd type="none" w="med" len="med"/>
-                      <a:tailEnd type="none" w="med" len="med"/>
-                    </a:lnB>
-                  </a:tcPr>
-                </a:tc>
-                <a:tc>
-                  <a:txBody>
-                    <a:bodyPr/>
-                    <a:lstStyle/>
-                    <a:p>
-                      <a:pPr marL="342900" indent="-342900" algn="l">
-                        <a:lnSpc>
-                          <a:spcPct val="150000"/>
-                        </a:lnSpc>
-                        <a:buFont typeface="Wingdings" panose="05000000000000000000" pitchFamily="2" charset="2"/>
-                        <a:buChar char="ü"/>
-                      </a:pPr>
-                      <a:r>
-                        <a:rPr lang="en-US" sz="2000" b="1">
-                          <a:latin typeface="+mj-lt"/>
-                          <a:cs typeface="Times" pitchFamily="18" charset="0"/>
-                        </a:rPr>
-                        <a:t>Consume a lot of time to debug</a:t>
-                      </a:r>
-                    </a:p>
-                    <a:p>
-                      <a:pPr marL="342900" indent="-342900" algn="l">
-                        <a:lnSpc>
-                          <a:spcPct val="150000"/>
-                        </a:lnSpc>
-                        <a:buFont typeface="Wingdings" panose="05000000000000000000" pitchFamily="2" charset="2"/>
-                        <a:buChar char="ü"/>
-                      </a:pPr>
-                      <a:r>
-                        <a:rPr lang="en-US" sz="2000" b="1">
-                          <a:latin typeface="+mj-lt"/>
-                          <a:cs typeface="Times" pitchFamily="18" charset="0"/>
-                        </a:rPr>
-                        <a:t>Can’t make best technical solutions</a:t>
-                      </a:r>
-                      <a:endParaRPr lang="en-US" sz="2000" b="1" dirty="0">
-                        <a:latin typeface="+mj-lt"/>
-                        <a:cs typeface="Times" pitchFamily="18" charset="0"/>
-                      </a:endParaRPr>
-                    </a:p>
-                    <a:p>
-                      <a:pPr algn="ctr">
-                        <a:lnSpc>
-                          <a:spcPct val="150000"/>
-                        </a:lnSpc>
-                      </a:pPr>
-                      <a:endParaRPr lang="en-US" sz="2000" b="1" dirty="0">
-                        <a:latin typeface="+mj-lt"/>
-                        <a:cs typeface="Times" pitchFamily="18" charset="0"/>
-                      </a:endParaRPr>
-                    </a:p>
-                  </a:txBody>
-                  <a:tcPr anchor="ctr">
-                    <a:lnL w="12700" cap="flat" cmpd="sng" algn="ctr">
-                      <a:solidFill>
-                        <a:schemeClr val="tx1"/>
-                      </a:solidFill>
-                      <a:prstDash val="solid"/>
-                      <a:round/>
-                      <a:headEnd type="none" w="med" len="med"/>
-                      <a:tailEnd type="none" w="med" len="med"/>
-                    </a:lnL>
-                    <a:lnR w="12700" cap="flat" cmpd="sng" algn="ctr">
-                      <a:solidFill>
-                        <a:schemeClr val="tx1"/>
-                      </a:solidFill>
-                      <a:prstDash val="solid"/>
-                      <a:round/>
-                      <a:headEnd type="none" w="med" len="med"/>
-                      <a:tailEnd type="none" w="med" len="med"/>
-                    </a:lnR>
-                    <a:lnT w="12700" cap="flat" cmpd="sng" algn="ctr">
-                      <a:solidFill>
-                        <a:schemeClr val="tx1"/>
-                      </a:solidFill>
-                      <a:prstDash val="solid"/>
-                      <a:round/>
-                      <a:headEnd type="none" w="med" len="med"/>
-                      <a:tailEnd type="none" w="med" len="med"/>
-                    </a:lnT>
-                    <a:lnB w="12700" cap="flat" cmpd="sng" algn="ctr">
-                      <a:solidFill>
-                        <a:schemeClr val="tx1"/>
-                      </a:solidFill>
-                      <a:prstDash val="solid"/>
-                      <a:round/>
-                      <a:headEnd type="none" w="med" len="med"/>
-                      <a:tailEnd type="none" w="med" len="med"/>
-                    </a:lnB>
-                  </a:tcPr>
-                </a:tc>
-                <a:tc>
-                  <a:txBody>
-                    <a:bodyPr/>
-                    <a:lstStyle/>
-                    <a:p>
-                      <a:pPr algn="l">
-                        <a:lnSpc>
-                          <a:spcPct val="150000"/>
-                        </a:lnSpc>
-                        <a:buFont typeface="Wingdings" pitchFamily="2" charset="2"/>
-                        <a:buChar char="ü"/>
-                      </a:pPr>
-                      <a:r>
-                        <a:rPr lang="en-US" sz="2000" b="1">
-                          <a:latin typeface="+mj-lt"/>
-                          <a:cs typeface="Times" pitchFamily="18" charset="0"/>
-                        </a:rPr>
-                        <a:t> Googling an answer</a:t>
-                      </a:r>
-                      <a:endParaRPr lang="en-US" sz="2000" b="1" baseline="0" dirty="0">
-                        <a:latin typeface="+mj-lt"/>
-                        <a:cs typeface="Times" pitchFamily="18" charset="0"/>
-                      </a:endParaRPr>
-                    </a:p>
-                    <a:p>
-                      <a:pPr algn="l">
-                        <a:lnSpc>
-                          <a:spcPct val="150000"/>
-                        </a:lnSpc>
-                        <a:buFont typeface="Wingdings" pitchFamily="2" charset="2"/>
-                        <a:buChar char="ü"/>
-                      </a:pPr>
-                      <a:r>
-                        <a:rPr lang="en-US" sz="2000" b="1" baseline="0">
-                          <a:latin typeface="+mj-lt"/>
-                          <a:cs typeface="Times" pitchFamily="18" charset="0"/>
-                        </a:rPr>
-                        <a:t> </a:t>
-                      </a:r>
-                      <a:r>
-                        <a:rPr lang="en-US" sz="1800" b="1" i="0" kern="1200">
-                          <a:solidFill>
-                            <a:schemeClr val="tx1"/>
-                          </a:solidFill>
-                          <a:effectLst/>
-                          <a:latin typeface="+mn-lt"/>
-                          <a:ea typeface="+mn-ea"/>
-                          <a:cs typeface="+mn-cs"/>
-                        </a:rPr>
-                        <a:t>Asking Friends</a:t>
-                      </a:r>
-                      <a:r>
-                        <a:rPr lang="en-US" sz="1800" b="0" i="0" kern="1200">
-                          <a:solidFill>
-                            <a:schemeClr val="tx1"/>
-                          </a:solidFill>
-                          <a:effectLst/>
-                          <a:latin typeface="+mn-lt"/>
-                          <a:ea typeface="+mn-ea"/>
-                          <a:cs typeface="+mn-cs"/>
-                        </a:rPr>
-                        <a:t> </a:t>
-                      </a:r>
-                      <a:endParaRPr lang="en-US" sz="2000" b="1" dirty="0">
-                        <a:latin typeface="+mj-lt"/>
-                        <a:cs typeface="Times" pitchFamily="18" charset="0"/>
-                      </a:endParaRPr>
-                    </a:p>
-                  </a:txBody>
-                  <a:tcPr anchor="ctr">
-                    <a:lnL w="12700" cap="flat" cmpd="sng" algn="ctr">
-                      <a:solidFill>
-                        <a:schemeClr val="tx1"/>
-                      </a:solidFill>
-                      <a:prstDash val="solid"/>
-                      <a:round/>
-                      <a:headEnd type="none" w="med" len="med"/>
-                      <a:tailEnd type="none" w="med" len="med"/>
-                    </a:lnL>
-                    <a:lnR w="12700" cap="flat" cmpd="sng" algn="ctr">
-                      <a:solidFill>
-                        <a:schemeClr val="tx1"/>
-                      </a:solidFill>
-                      <a:prstDash val="solid"/>
-                      <a:round/>
-                      <a:headEnd type="none" w="med" len="med"/>
-                      <a:tailEnd type="none" w="med" len="med"/>
-                    </a:lnR>
-                    <a:lnT w="12700" cap="flat" cmpd="sng" algn="ctr">
-                      <a:solidFill>
-                        <a:schemeClr val="tx1"/>
-                      </a:solidFill>
-                      <a:prstDash val="solid"/>
-                      <a:round/>
-                      <a:headEnd type="none" w="med" len="med"/>
-                      <a:tailEnd type="none" w="med" len="med"/>
-                    </a:lnT>
-                    <a:lnB w="12700" cap="flat" cmpd="sng" algn="ctr">
-                      <a:solidFill>
-                        <a:schemeClr val="tx1"/>
-                      </a:solidFill>
-                      <a:prstDash val="solid"/>
-                      <a:round/>
-                      <a:headEnd type="none" w="med" len="med"/>
-                      <a:tailEnd type="none" w="med" len="med"/>
-                    </a:lnB>
-                  </a:tcPr>
-                </a:tc>
-                <a:extLst>
-                  <a:ext uri="{0D108BD9-81ED-4DB2-BD59-A6C34878D82A}">
-                    <a16:rowId xmlns:a16="http://schemas.microsoft.com/office/drawing/2014/main" val="10002"/>
-                  </a:ext>
-                </a:extLst>
-              </a:tr>
-            </a:tbl>
-          </a:graphicData>
-        </a:graphic>
-      </p:graphicFrame>
+      <p:sp>
+        <p:nvSpPr>
+          <p:cNvPr id="2" name="Rectangle 1"/>
+          <p:cNvSpPr/>
+          <p:nvPr/>
+        </p:nvSpPr>
+        <p:spPr>
+          <a:xfrm>
+            <a:off x="772297" y="1618361"/>
+            <a:ext cx="9089155" cy="461665"/>
+          </a:xfrm>
+          <a:prstGeom prst="rect">
+            <a:avLst/>
+          </a:prstGeom>
+        </p:spPr>
+        <p:txBody>
+          <a:bodyPr wrap="square">
+            <a:spAutoFit/>
+          </a:bodyPr>
+          <a:lstStyle/>
+          <a:p>
+            <a:pPr marL="342900" indent="-342900">
+              <a:buFont typeface="Arial" panose="020B0604020202020204" pitchFamily="34" charset="0"/>
+              <a:buChar char="•"/>
+            </a:pPr>
+            <a:r>
+              <a:rPr lang="en-US" sz="2400">
+                <a:ea typeface="Calibri" panose="020F0502020204030204" pitchFamily="34" charset="0"/>
+              </a:rPr>
+              <a:t>Asking other for helping when stressed, deadline is coming closer.</a:t>
+            </a:r>
+            <a:endParaRPr lang="en-US" sz="2400"/>
+          </a:p>
+        </p:txBody>
+      </p:sp>
+      <p:pic>
+        <p:nvPicPr>
+          <p:cNvPr id="9" name="Picture 8"/>
+          <p:cNvPicPr>
+            <a:picLocks noChangeAspect="1"/>
+          </p:cNvPicPr>
+          <p:nvPr/>
+        </p:nvPicPr>
+        <p:blipFill>
+          <a:blip r:embed="rId2">
+            <a:duotone>
+              <a:schemeClr val="accent1">
+                <a:shade val="45000"/>
+                <a:satMod val="135000"/>
+              </a:schemeClr>
+              <a:prstClr val="white"/>
+            </a:duotone>
+          </a:blip>
+          <a:stretch>
+            <a:fillRect/>
+          </a:stretch>
+        </p:blipFill>
+        <p:spPr>
+          <a:xfrm>
+            <a:off x="0" y="2616589"/>
+            <a:ext cx="4164037" cy="3840482"/>
+          </a:xfrm>
+          <a:prstGeom prst="rect">
+            <a:avLst/>
+          </a:prstGeom>
+        </p:spPr>
+      </p:pic>
+      <p:pic>
+        <p:nvPicPr>
+          <p:cNvPr id="11" name="Picture 10"/>
+          <p:cNvPicPr>
+            <a:picLocks noChangeAspect="1"/>
+          </p:cNvPicPr>
+          <p:nvPr/>
+        </p:nvPicPr>
+        <p:blipFill>
+          <a:blip r:embed="rId3"/>
+          <a:stretch>
+            <a:fillRect/>
+          </a:stretch>
+        </p:blipFill>
+        <p:spPr>
+          <a:xfrm>
+            <a:off x="7272631" y="3398666"/>
+            <a:ext cx="4919369" cy="2807455"/>
+          </a:xfrm>
+          <a:prstGeom prst="ellipse">
+            <a:avLst/>
+          </a:prstGeom>
+        </p:spPr>
+      </p:pic>
+      <p:sp>
+        <p:nvSpPr>
+          <p:cNvPr id="12" name="Arrow: Right 11"/>
+          <p:cNvSpPr/>
+          <p:nvPr/>
+        </p:nvSpPr>
+        <p:spPr>
+          <a:xfrm>
+            <a:off x="4487594" y="4360103"/>
+            <a:ext cx="2644726" cy="633928"/>
+          </a:xfrm>
+          <a:prstGeom prst="rightArrow">
+            <a:avLst/>
+          </a:prstGeom>
+        </p:spPr>
+        <p:style>
+          <a:lnRef idx="2">
+            <a:schemeClr val="accent6"/>
+          </a:lnRef>
+          <a:fillRef idx="1">
+            <a:schemeClr val="lt1"/>
+          </a:fillRef>
+          <a:effectRef idx="0">
+            <a:schemeClr val="accent6"/>
+          </a:effectRef>
+          <a:fontRef idx="minor">
+            <a:schemeClr val="dk1"/>
+          </a:fontRef>
+        </p:style>
+        <p:txBody>
+          <a:bodyPr rtlCol="0" anchor="ctr"/>
+          <a:lstStyle/>
+          <a:p>
+            <a:pPr algn="ctr"/>
+            <a:r>
+              <a:rPr lang="en-US" sz="2400"/>
+              <a:t>Asking</a:t>
+            </a:r>
+          </a:p>
+        </p:txBody>
+      </p:sp>
     </p:spTree>
     <p:extLst>
       <p:ext uri="{BB962C8B-B14F-4D97-AF65-F5344CB8AC3E}">
-        <p14:creationId xmlns:p14="http://schemas.microsoft.com/office/powerpoint/2010/main" val="1523933752"/>
+        <p14:creationId xmlns:p14="http://schemas.microsoft.com/office/powerpoint/2010/main" val="401730027"/>
       </p:ext>
     </p:extLst>
   </p:cSld>
@@ -26713,49 +26106,207 @@
       </p:grpSpPr>
       <p:sp>
         <p:nvSpPr>
-          <p:cNvPr id="2" name="Title 1"/>
-          <p:cNvSpPr>
-            <a:spLocks noGrp="1"/>
-          </p:cNvSpPr>
-          <p:nvPr>
-            <p:ph type="title"/>
-          </p:nvPr>
+          <p:cNvPr id="4" name="Pentagon 4"/>
+          <p:cNvSpPr/>
+          <p:nvPr/>
         </p:nvSpPr>
-        <p:spPr/>
+        <p:spPr>
+          <a:xfrm>
+            <a:off x="772297" y="488673"/>
+            <a:ext cx="4703805" cy="593125"/>
+          </a:xfrm>
+          <a:prstGeom prst="homePlate">
+            <a:avLst/>
+          </a:prstGeom>
+        </p:spPr>
+        <p:style>
+          <a:lnRef idx="1">
+            <a:schemeClr val="accent3"/>
+          </a:lnRef>
+          <a:fillRef idx="3">
+            <a:schemeClr val="accent3"/>
+          </a:fillRef>
+          <a:effectRef idx="2">
+            <a:schemeClr val="accent3"/>
+          </a:effectRef>
+          <a:fontRef idx="minor">
+            <a:schemeClr val="lt1"/>
+          </a:fontRef>
+        </p:style>
         <p:txBody>
-          <a:bodyPr/>
+          <a:bodyPr rtlCol="0" anchor="ctr"/>
           <a:lstStyle/>
           <a:p>
+            <a:pPr algn="ctr"/>
             <a:r>
               <a:rPr lang="en-US" dirty="0"/>
-              <a:t>Questions &amp; answers</a:t>
+              <a:t>Project Result</a:t>
             </a:r>
           </a:p>
         </p:txBody>
       </p:sp>
       <p:sp>
         <p:nvSpPr>
-          <p:cNvPr id="3" name="Content Placeholder 2"/>
-          <p:cNvSpPr>
-            <a:spLocks noGrp="1"/>
-          </p:cNvSpPr>
-          <p:nvPr>
-            <p:ph idx="1"/>
-          </p:nvPr>
+          <p:cNvPr id="5" name="Chevron 5"/>
+          <p:cNvSpPr/>
+          <p:nvPr/>
         </p:nvSpPr>
-        <p:spPr/>
+        <p:spPr>
+          <a:xfrm>
+            <a:off x="5278985" y="488673"/>
+            <a:ext cx="4703805" cy="593125"/>
+          </a:xfrm>
+          <a:prstGeom prst="chevron">
+            <a:avLst/>
+          </a:prstGeom>
+        </p:spPr>
+        <p:style>
+          <a:lnRef idx="1">
+            <a:schemeClr val="accent3"/>
+          </a:lnRef>
+          <a:fillRef idx="3">
+            <a:schemeClr val="accent3"/>
+          </a:fillRef>
+          <a:effectRef idx="2">
+            <a:schemeClr val="accent3"/>
+          </a:effectRef>
+          <a:fontRef idx="minor">
+            <a:schemeClr val="lt1"/>
+          </a:fontRef>
+        </p:style>
         <p:txBody>
-          <a:bodyPr/>
+          <a:bodyPr rtlCol="0" anchor="ctr"/>
           <a:lstStyle/>
           <a:p>
-            <a:endParaRPr lang="en-US"/>
+            <a:pPr algn="ctr"/>
+            <a:r>
+              <a:rPr lang="en-US" dirty="0"/>
+              <a:t>Lesson Learned</a:t>
+            </a:r>
           </a:p>
         </p:txBody>
       </p:sp>
+      <p:sp>
+        <p:nvSpPr>
+          <p:cNvPr id="2" name="Rectangle 1"/>
+          <p:cNvSpPr/>
+          <p:nvPr/>
+        </p:nvSpPr>
+        <p:spPr>
+          <a:xfrm>
+            <a:off x="772297" y="1618361"/>
+            <a:ext cx="9089155" cy="461665"/>
+          </a:xfrm>
+          <a:prstGeom prst="rect">
+            <a:avLst/>
+          </a:prstGeom>
+        </p:spPr>
+        <p:txBody>
+          <a:bodyPr wrap="square">
+            <a:spAutoFit/>
+          </a:bodyPr>
+          <a:lstStyle/>
+          <a:p>
+            <a:pPr marL="342900" indent="-342900">
+              <a:buFont typeface="Arial" panose="020B0604020202020204" pitchFamily="34" charset="0"/>
+              <a:buChar char="•"/>
+            </a:pPr>
+            <a:r>
+              <a:rPr lang="en-US" sz="2400"/>
+              <a:t>Prioritize work, focus on something more important</a:t>
+            </a:r>
+          </a:p>
+        </p:txBody>
+      </p:sp>
+      <p:sp>
+        <p:nvSpPr>
+          <p:cNvPr id="12" name="Arrow: Right 11"/>
+          <p:cNvSpPr/>
+          <p:nvPr/>
+        </p:nvSpPr>
+        <p:spPr>
+          <a:xfrm>
+            <a:off x="4259077" y="4360102"/>
+            <a:ext cx="2039815" cy="633928"/>
+          </a:xfrm>
+          <a:prstGeom prst="rightArrow">
+            <a:avLst/>
+          </a:prstGeom>
+        </p:spPr>
+        <p:style>
+          <a:lnRef idx="2">
+            <a:schemeClr val="accent6"/>
+          </a:lnRef>
+          <a:fillRef idx="1">
+            <a:schemeClr val="lt1"/>
+          </a:fillRef>
+          <a:effectRef idx="0">
+            <a:schemeClr val="accent6"/>
+          </a:effectRef>
+          <a:fontRef idx="minor">
+            <a:schemeClr val="dk1"/>
+          </a:fontRef>
+        </p:style>
+        <p:txBody>
+          <a:bodyPr rtlCol="0" anchor="ctr"/>
+          <a:lstStyle/>
+          <a:p>
+            <a:pPr algn="ctr"/>
+            <a:endParaRPr lang="en-US" sz="2400"/>
+          </a:p>
+        </p:txBody>
+      </p:sp>
+      <p:pic>
+        <p:nvPicPr>
+          <p:cNvPr id="8" name="Picture 7"/>
+          <p:cNvPicPr>
+            <a:picLocks noChangeAspect="1"/>
+          </p:cNvPicPr>
+          <p:nvPr/>
+        </p:nvPicPr>
+        <p:blipFill rotWithShape="1">
+          <a:blip r:embed="rId2"/>
+          <a:srcRect b="8512"/>
+          <a:stretch/>
+        </p:blipFill>
+        <p:spPr>
+          <a:xfrm>
+            <a:off x="0" y="3052689"/>
+            <a:ext cx="4019153" cy="3247082"/>
+          </a:xfrm>
+          <a:prstGeom prst="ellipse">
+            <a:avLst/>
+          </a:prstGeom>
+        </p:spPr>
+      </p:pic>
+      <p:pic>
+        <p:nvPicPr>
+          <p:cNvPr id="13" name="Picture 12"/>
+          <p:cNvPicPr>
+            <a:picLocks noChangeAspect="1"/>
+          </p:cNvPicPr>
+          <p:nvPr/>
+        </p:nvPicPr>
+        <p:blipFill>
+          <a:blip r:embed="rId3"/>
+          <a:stretch>
+            <a:fillRect/>
+          </a:stretch>
+        </p:blipFill>
+        <p:spPr>
+          <a:xfrm>
+            <a:off x="6298892" y="2295741"/>
+            <a:ext cx="5812909" cy="4128723"/>
+          </a:xfrm>
+          <a:prstGeom prst="ellipse">
+            <a:avLst/>
+          </a:prstGeom>
+        </p:spPr>
+      </p:pic>
     </p:spTree>
     <p:extLst>
       <p:ext uri="{BB962C8B-B14F-4D97-AF65-F5344CB8AC3E}">
-        <p14:creationId xmlns:p14="http://schemas.microsoft.com/office/powerpoint/2010/main" val="173373629"/>
+        <p14:creationId xmlns:p14="http://schemas.microsoft.com/office/powerpoint/2010/main" val="351500536"/>
       </p:ext>
     </p:extLst>
   </p:cSld>
@@ -26799,7 +26350,7 @@
           <a:p>
             <a:r>
               <a:rPr lang="en-US" dirty="0"/>
-              <a:t>demo</a:t>
+              <a:t>Questions &amp; answers</a:t>
             </a:r>
           </a:p>
         </p:txBody>
@@ -26826,7 +26377,7 @@
     </p:spTree>
     <p:extLst>
       <p:ext uri="{BB962C8B-B14F-4D97-AF65-F5344CB8AC3E}">
-        <p14:creationId xmlns:p14="http://schemas.microsoft.com/office/powerpoint/2010/main" val="2517311989"/>
+        <p14:creationId xmlns:p14="http://schemas.microsoft.com/office/powerpoint/2010/main" val="173373629"/>
       </p:ext>
     </p:extLst>
   </p:cSld>
@@ -27036,6 +26587,77 @@
     <p:extLst>
       <p:ext uri="{BB962C8B-B14F-4D97-AF65-F5344CB8AC3E}">
         <p14:creationId xmlns:p14="http://schemas.microsoft.com/office/powerpoint/2010/main" val="3366271720"/>
+      </p:ext>
+    </p:extLst>
+  </p:cSld>
+  <p:clrMapOvr>
+    <a:masterClrMapping/>
+  </p:clrMapOvr>
+</p:sld>
+</file>
+
+<file path=ppt/slides/slide40.xml><?xml version="1.0" encoding="utf-8"?>
+<p:sld xmlns:a="http://schemas.openxmlformats.org/drawingml/2006/main" xmlns:r="http://schemas.openxmlformats.org/officeDocument/2006/relationships" xmlns:p="http://schemas.openxmlformats.org/presentationml/2006/main">
+  <p:cSld>
+    <p:spTree>
+      <p:nvGrpSpPr>
+        <p:cNvPr id="1" name=""/>
+        <p:cNvGrpSpPr/>
+        <p:nvPr/>
+      </p:nvGrpSpPr>
+      <p:grpSpPr>
+        <a:xfrm>
+          <a:off x="0" y="0"/>
+          <a:ext cx="0" cy="0"/>
+          <a:chOff x="0" y="0"/>
+          <a:chExt cx="0" cy="0"/>
+        </a:xfrm>
+      </p:grpSpPr>
+      <p:sp>
+        <p:nvSpPr>
+          <p:cNvPr id="2" name="Title 1"/>
+          <p:cNvSpPr>
+            <a:spLocks noGrp="1"/>
+          </p:cNvSpPr>
+          <p:nvPr>
+            <p:ph type="title"/>
+          </p:nvPr>
+        </p:nvSpPr>
+        <p:spPr/>
+        <p:txBody>
+          <a:bodyPr/>
+          <a:lstStyle/>
+          <a:p>
+            <a:r>
+              <a:rPr lang="en-US" dirty="0"/>
+              <a:t>demo</a:t>
+            </a:r>
+          </a:p>
+        </p:txBody>
+      </p:sp>
+      <p:sp>
+        <p:nvSpPr>
+          <p:cNvPr id="3" name="Content Placeholder 2"/>
+          <p:cNvSpPr>
+            <a:spLocks noGrp="1"/>
+          </p:cNvSpPr>
+          <p:nvPr>
+            <p:ph idx="1"/>
+          </p:nvPr>
+        </p:nvSpPr>
+        <p:spPr/>
+        <p:txBody>
+          <a:bodyPr/>
+          <a:lstStyle/>
+          <a:p>
+            <a:endParaRPr lang="en-US"/>
+          </a:p>
+        </p:txBody>
+      </p:sp>
+    </p:spTree>
+    <p:extLst>
+      <p:ext uri="{BB962C8B-B14F-4D97-AF65-F5344CB8AC3E}">
+        <p14:creationId xmlns:p14="http://schemas.microsoft.com/office/powerpoint/2010/main" val="2517311989"/>
       </p:ext>
     </p:extLst>
   </p:cSld>

</xml_diff>